<commit_message>
Documentation + small errors
</commit_message>
<xml_diff>
--- a/live/images/images design.pptx
+++ b/live/images/images design.pptx
@@ -7,6 +7,8 @@
   <p:sldIdLst>
     <p:sldId id="256" r:id="rId2"/>
     <p:sldId id="257" r:id="rId3"/>
+    <p:sldId id="258" r:id="rId4"/>
+    <p:sldId id="259" r:id="rId5"/>
   </p:sldIdLst>
   <p:sldSz cx="12192000" cy="6858000"/>
   <p:notesSz cx="6858000" cy="9144000"/>
@@ -242,7 +244,7 @@
           <a:p>
             <a:fld id="{29F8D618-3CF6-4EF1-8362-E14DF3794448}" type="datetimeFigureOut">
               <a:rPr lang="en-US" smtClean="0"/>
-              <a:t>1/6/2017</a:t>
+              <a:t>1/7/2017</a:t>
             </a:fld>
             <a:endParaRPr lang="en-US"/>
           </a:p>
@@ -410,7 +412,7 @@
           <a:p>
             <a:fld id="{29F8D618-3CF6-4EF1-8362-E14DF3794448}" type="datetimeFigureOut">
               <a:rPr lang="en-US" smtClean="0"/>
-              <a:t>1/6/2017</a:t>
+              <a:t>1/7/2017</a:t>
             </a:fld>
             <a:endParaRPr lang="en-US"/>
           </a:p>
@@ -588,7 +590,7 @@
           <a:p>
             <a:fld id="{29F8D618-3CF6-4EF1-8362-E14DF3794448}" type="datetimeFigureOut">
               <a:rPr lang="en-US" smtClean="0"/>
-              <a:t>1/6/2017</a:t>
+              <a:t>1/7/2017</a:t>
             </a:fld>
             <a:endParaRPr lang="en-US"/>
           </a:p>
@@ -756,7 +758,7 @@
           <a:p>
             <a:fld id="{29F8D618-3CF6-4EF1-8362-E14DF3794448}" type="datetimeFigureOut">
               <a:rPr lang="en-US" smtClean="0"/>
-              <a:t>1/6/2017</a:t>
+              <a:t>1/7/2017</a:t>
             </a:fld>
             <a:endParaRPr lang="en-US"/>
           </a:p>
@@ -1001,7 +1003,7 @@
           <a:p>
             <a:fld id="{29F8D618-3CF6-4EF1-8362-E14DF3794448}" type="datetimeFigureOut">
               <a:rPr lang="en-US" smtClean="0"/>
-              <a:t>1/6/2017</a:t>
+              <a:t>1/7/2017</a:t>
             </a:fld>
             <a:endParaRPr lang="en-US"/>
           </a:p>
@@ -1230,7 +1232,7 @@
           <a:p>
             <a:fld id="{29F8D618-3CF6-4EF1-8362-E14DF3794448}" type="datetimeFigureOut">
               <a:rPr lang="en-US" smtClean="0"/>
-              <a:t>1/6/2017</a:t>
+              <a:t>1/7/2017</a:t>
             </a:fld>
             <a:endParaRPr lang="en-US"/>
           </a:p>
@@ -1594,7 +1596,7 @@
           <a:p>
             <a:fld id="{29F8D618-3CF6-4EF1-8362-E14DF3794448}" type="datetimeFigureOut">
               <a:rPr lang="en-US" smtClean="0"/>
-              <a:t>1/6/2017</a:t>
+              <a:t>1/7/2017</a:t>
             </a:fld>
             <a:endParaRPr lang="en-US"/>
           </a:p>
@@ -1711,7 +1713,7 @@
           <a:p>
             <a:fld id="{29F8D618-3CF6-4EF1-8362-E14DF3794448}" type="datetimeFigureOut">
               <a:rPr lang="en-US" smtClean="0"/>
-              <a:t>1/6/2017</a:t>
+              <a:t>1/7/2017</a:t>
             </a:fld>
             <a:endParaRPr lang="en-US"/>
           </a:p>
@@ -1806,7 +1808,7 @@
           <a:p>
             <a:fld id="{29F8D618-3CF6-4EF1-8362-E14DF3794448}" type="datetimeFigureOut">
               <a:rPr lang="en-US" smtClean="0"/>
-              <a:t>1/6/2017</a:t>
+              <a:t>1/7/2017</a:t>
             </a:fld>
             <a:endParaRPr lang="en-US"/>
           </a:p>
@@ -2081,7 +2083,7 @@
           <a:p>
             <a:fld id="{29F8D618-3CF6-4EF1-8362-E14DF3794448}" type="datetimeFigureOut">
               <a:rPr lang="en-US" smtClean="0"/>
-              <a:t>1/6/2017</a:t>
+              <a:t>1/7/2017</a:t>
             </a:fld>
             <a:endParaRPr lang="en-US"/>
           </a:p>
@@ -2333,7 +2335,7 @@
           <a:p>
             <a:fld id="{29F8D618-3CF6-4EF1-8362-E14DF3794448}" type="datetimeFigureOut">
               <a:rPr lang="en-US" smtClean="0"/>
-              <a:t>1/6/2017</a:t>
+              <a:t>1/7/2017</a:t>
             </a:fld>
             <a:endParaRPr lang="en-US"/>
           </a:p>
@@ -2544,7 +2546,7 @@
           <a:p>
             <a:fld id="{29F8D618-3CF6-4EF1-8362-E14DF3794448}" type="datetimeFigureOut">
               <a:rPr lang="en-US" smtClean="0"/>
-              <a:t>1/6/2017</a:t>
+              <a:t>1/7/2017</a:t>
             </a:fld>
             <a:endParaRPr lang="en-US"/>
           </a:p>
@@ -5038,6 +5040,1992 @@
 </p:sld>
 </file>
 
+<file path=ppt/slides/slide3.xml><?xml version="1.0" encoding="utf-8"?>
+<p:sld xmlns:a="http://schemas.openxmlformats.org/drawingml/2006/main" xmlns:r="http://schemas.openxmlformats.org/officeDocument/2006/relationships" xmlns:p="http://schemas.openxmlformats.org/presentationml/2006/main">
+  <p:cSld>
+    <p:spTree>
+      <p:nvGrpSpPr>
+        <p:cNvPr id="1" name=""/>
+        <p:cNvGrpSpPr/>
+        <p:nvPr/>
+      </p:nvGrpSpPr>
+      <p:grpSpPr>
+        <a:xfrm>
+          <a:off x="0" y="0"/>
+          <a:ext cx="0" cy="0"/>
+          <a:chOff x="0" y="0"/>
+          <a:chExt cx="0" cy="0"/>
+        </a:xfrm>
+      </p:grpSpPr>
+      <p:grpSp>
+        <p:nvGrpSpPr>
+          <p:cNvPr id="187" name="Group 186"/>
+          <p:cNvGrpSpPr/>
+          <p:nvPr/>
+        </p:nvGrpSpPr>
+        <p:grpSpPr>
+          <a:xfrm>
+            <a:off x="126290" y="102485"/>
+            <a:ext cx="12040998" cy="6762587"/>
+            <a:chOff x="126290" y="102485"/>
+            <a:chExt cx="12040998" cy="6762587"/>
+          </a:xfrm>
+        </p:grpSpPr>
+        <p:sp>
+          <p:nvSpPr>
+            <p:cNvPr id="2" name="Rectangle 1"/>
+            <p:cNvSpPr/>
+            <p:nvPr/>
+          </p:nvSpPr>
+          <p:spPr>
+            <a:xfrm>
+              <a:off x="1474978" y="2238383"/>
+              <a:ext cx="1103984" cy="2123658"/>
+            </a:xfrm>
+            <a:prstGeom prst="rect">
+              <a:avLst/>
+            </a:prstGeom>
+          </p:spPr>
+          <p:txBody>
+            <a:bodyPr wrap="square">
+              <a:spAutoFit/>
+            </a:bodyPr>
+            <a:lstStyle/>
+            <a:p>
+              <a:r>
+                <a:rPr lang="fr-BE" sz="1200" noProof="1"/>
+                <a:t>Diagram</a:t>
+              </a:r>
+            </a:p>
+            <a:p>
+              <a:r>
+                <a:rPr lang="fr-BE" sz="1200" noProof="1"/>
+                <a:t>Sequence</a:t>
+              </a:r>
+            </a:p>
+            <a:p>
+              <a:r>
+                <a:rPr lang="fr-BE" sz="1200" noProof="1"/>
+                <a:t>Stack</a:t>
+              </a:r>
+            </a:p>
+            <a:p>
+              <a:r>
+                <a:rPr lang="fr-BE" sz="1200" noProof="1"/>
+                <a:t>Choice</a:t>
+              </a:r>
+            </a:p>
+            <a:p>
+              <a:r>
+                <a:rPr lang="fr-BE" sz="1200" noProof="1"/>
+                <a:t>Optional</a:t>
+              </a:r>
+            </a:p>
+            <a:p>
+              <a:r>
+                <a:rPr lang="fr-BE" sz="1200" noProof="1"/>
+                <a:t>OneOrMore</a:t>
+              </a:r>
+            </a:p>
+            <a:p>
+              <a:r>
+                <a:rPr lang="fr-BE" sz="1200" noProof="1"/>
+                <a:t>ZeroOrMore</a:t>
+              </a:r>
+            </a:p>
+            <a:p>
+              <a:r>
+                <a:rPr lang="fr-BE" sz="1200" noProof="1"/>
+                <a:t>Terminal</a:t>
+              </a:r>
+            </a:p>
+            <a:p>
+              <a:r>
+                <a:rPr lang="fr-BE" sz="1200" noProof="1"/>
+                <a:t>NonTerminal</a:t>
+              </a:r>
+            </a:p>
+            <a:p>
+              <a:r>
+                <a:rPr lang="fr-BE" sz="1200" noProof="1"/>
+                <a:t>Comment</a:t>
+              </a:r>
+            </a:p>
+            <a:p>
+              <a:r>
+                <a:rPr lang="fr-BE" sz="1200" noProof="1"/>
+                <a:t>Skip</a:t>
+              </a:r>
+            </a:p>
+          </p:txBody>
+        </p:sp>
+        <p:cxnSp>
+          <p:nvCxnSpPr>
+            <p:cNvPr id="4" name="Straight Arrow Connector 3"/>
+            <p:cNvCxnSpPr>
+              <a:stCxn id="2" idx="3"/>
+              <a:endCxn id="5" idx="1"/>
+            </p:cNvCxnSpPr>
+            <p:nvPr/>
+          </p:nvCxnSpPr>
+          <p:spPr>
+            <a:xfrm>
+              <a:off x="2578962" y="3300212"/>
+              <a:ext cx="513135" cy="960983"/>
+            </a:xfrm>
+            <a:prstGeom prst="straightConnector1">
+              <a:avLst/>
+            </a:prstGeom>
+            <a:ln>
+              <a:tailEnd type="triangle"/>
+            </a:ln>
+          </p:spPr>
+          <p:style>
+            <a:lnRef idx="1">
+              <a:schemeClr val="accent1"/>
+            </a:lnRef>
+            <a:fillRef idx="0">
+              <a:schemeClr val="accent1"/>
+            </a:fillRef>
+            <a:effectRef idx="0">
+              <a:schemeClr val="accent1"/>
+            </a:effectRef>
+            <a:fontRef idx="minor">
+              <a:schemeClr val="tx1"/>
+            </a:fontRef>
+          </p:style>
+        </p:cxnSp>
+        <p:sp>
+          <p:nvSpPr>
+            <p:cNvPr id="5" name="Rectangle 4"/>
+            <p:cNvSpPr/>
+            <p:nvPr/>
+          </p:nvSpPr>
+          <p:spPr>
+            <a:xfrm>
+              <a:off x="3092097" y="3808043"/>
+              <a:ext cx="1326525" cy="906303"/>
+            </a:xfrm>
+            <a:prstGeom prst="rect">
+              <a:avLst/>
+            </a:prstGeom>
+          </p:spPr>
+          <p:style>
+            <a:lnRef idx="2">
+              <a:schemeClr val="accent1">
+                <a:shade val="50000"/>
+              </a:schemeClr>
+            </a:lnRef>
+            <a:fillRef idx="1">
+              <a:schemeClr val="accent1"/>
+            </a:fillRef>
+            <a:effectRef idx="0">
+              <a:schemeClr val="accent1"/>
+            </a:effectRef>
+            <a:fontRef idx="minor">
+              <a:schemeClr val="lt1"/>
+            </a:fontRef>
+          </p:style>
+          <p:txBody>
+            <a:bodyPr rtlCol="0" anchor="ctr"/>
+            <a:lstStyle/>
+            <a:p>
+              <a:pPr algn="ctr"/>
+              <a:r>
+                <a:rPr lang="en-US" dirty="0"/>
+                <a:t>Tree</a:t>
+              </a:r>
+            </a:p>
+          </p:txBody>
+        </p:sp>
+        <p:sp>
+          <p:nvSpPr>
+            <p:cNvPr id="9" name="Rectangle 8"/>
+            <p:cNvSpPr/>
+            <p:nvPr/>
+          </p:nvSpPr>
+          <p:spPr>
+            <a:xfrm>
+              <a:off x="3066537" y="2238383"/>
+              <a:ext cx="1326525" cy="906303"/>
+            </a:xfrm>
+            <a:prstGeom prst="rect">
+              <a:avLst/>
+            </a:prstGeom>
+          </p:spPr>
+          <p:style>
+            <a:lnRef idx="2">
+              <a:schemeClr val="accent1">
+                <a:shade val="50000"/>
+              </a:schemeClr>
+            </a:lnRef>
+            <a:fillRef idx="1">
+              <a:schemeClr val="accent1"/>
+            </a:fillRef>
+            <a:effectRef idx="0">
+              <a:schemeClr val="accent1"/>
+            </a:effectRef>
+            <a:fontRef idx="minor">
+              <a:schemeClr val="lt1"/>
+            </a:fontRef>
+          </p:style>
+          <p:txBody>
+            <a:bodyPr rtlCol="0" anchor="ctr"/>
+            <a:lstStyle/>
+            <a:p>
+              <a:pPr algn="ctr"/>
+              <a:r>
+                <a:rPr lang="en-US" dirty="0"/>
+                <a:t>EBNF</a:t>
+              </a:r>
+            </a:p>
+          </p:txBody>
+        </p:sp>
+        <p:cxnSp>
+          <p:nvCxnSpPr>
+            <p:cNvPr id="10" name="Straight Arrow Connector 9"/>
+            <p:cNvCxnSpPr>
+              <a:stCxn id="2" idx="3"/>
+              <a:endCxn id="9" idx="1"/>
+            </p:cNvCxnSpPr>
+            <p:nvPr/>
+          </p:nvCxnSpPr>
+          <p:spPr>
+            <a:xfrm flipV="1">
+              <a:off x="2578962" y="2691535"/>
+              <a:ext cx="487575" cy="608677"/>
+            </a:xfrm>
+            <a:prstGeom prst="straightConnector1">
+              <a:avLst/>
+            </a:prstGeom>
+            <a:ln>
+              <a:tailEnd type="triangle"/>
+            </a:ln>
+          </p:spPr>
+          <p:style>
+            <a:lnRef idx="1">
+              <a:schemeClr val="accent1"/>
+            </a:lnRef>
+            <a:fillRef idx="0">
+              <a:schemeClr val="accent1"/>
+            </a:fillRef>
+            <a:effectRef idx="0">
+              <a:schemeClr val="accent1"/>
+            </a:effectRef>
+            <a:fontRef idx="minor">
+              <a:schemeClr val="tx1"/>
+            </a:fontRef>
+          </p:style>
+        </p:cxnSp>
+        <p:sp>
+          <p:nvSpPr>
+            <p:cNvPr id="14" name="Rectangle 13"/>
+            <p:cNvSpPr/>
+            <p:nvPr/>
+          </p:nvSpPr>
+          <p:spPr>
+            <a:xfrm>
+              <a:off x="3081164" y="5341464"/>
+              <a:ext cx="1326525" cy="906303"/>
+            </a:xfrm>
+            <a:prstGeom prst="rect">
+              <a:avLst/>
+            </a:prstGeom>
+          </p:spPr>
+          <p:style>
+            <a:lnRef idx="2">
+              <a:schemeClr val="accent1">
+                <a:shade val="50000"/>
+              </a:schemeClr>
+            </a:lnRef>
+            <a:fillRef idx="1">
+              <a:schemeClr val="accent1"/>
+            </a:fillRef>
+            <a:effectRef idx="0">
+              <a:schemeClr val="accent1"/>
+            </a:effectRef>
+            <a:fontRef idx="minor">
+              <a:schemeClr val="lt1"/>
+            </a:fontRef>
+          </p:style>
+          <p:txBody>
+            <a:bodyPr rtlCol="0" anchor="ctr"/>
+            <a:lstStyle/>
+            <a:p>
+              <a:pPr algn="ctr"/>
+              <a:r>
+                <a:rPr lang="en-US" dirty="0"/>
+                <a:t>Generating</a:t>
+              </a:r>
+            </a:p>
+          </p:txBody>
+        </p:sp>
+        <p:cxnSp>
+          <p:nvCxnSpPr>
+            <p:cNvPr id="15" name="Straight Arrow Connector 14"/>
+            <p:cNvCxnSpPr>
+              <a:stCxn id="2" idx="3"/>
+              <a:endCxn id="14" idx="1"/>
+            </p:cNvCxnSpPr>
+            <p:nvPr/>
+          </p:nvCxnSpPr>
+          <p:spPr>
+            <a:xfrm>
+              <a:off x="2578962" y="3300212"/>
+              <a:ext cx="502202" cy="2494404"/>
+            </a:xfrm>
+            <a:prstGeom prst="straightConnector1">
+              <a:avLst/>
+            </a:prstGeom>
+            <a:ln>
+              <a:tailEnd type="triangle"/>
+            </a:ln>
+          </p:spPr>
+          <p:style>
+            <a:lnRef idx="1">
+              <a:schemeClr val="accent1"/>
+            </a:lnRef>
+            <a:fillRef idx="0">
+              <a:schemeClr val="accent1"/>
+            </a:fillRef>
+            <a:effectRef idx="0">
+              <a:schemeClr val="accent1"/>
+            </a:effectRef>
+            <a:fontRef idx="minor">
+              <a:schemeClr val="tx1"/>
+            </a:fontRef>
+          </p:style>
+        </p:cxnSp>
+        <p:sp>
+          <p:nvSpPr>
+            <p:cNvPr id="26" name="Rectangle 25"/>
+            <p:cNvSpPr/>
+            <p:nvPr/>
+          </p:nvSpPr>
+          <p:spPr>
+            <a:xfrm>
+              <a:off x="126290" y="2923529"/>
+              <a:ext cx="1171977" cy="753366"/>
+            </a:xfrm>
+            <a:prstGeom prst="rect">
+              <a:avLst/>
+            </a:prstGeom>
+          </p:spPr>
+          <p:style>
+            <a:lnRef idx="2">
+              <a:schemeClr val="accent1">
+                <a:shade val="50000"/>
+              </a:schemeClr>
+            </a:lnRef>
+            <a:fillRef idx="1">
+              <a:schemeClr val="accent1"/>
+            </a:fillRef>
+            <a:effectRef idx="0">
+              <a:schemeClr val="accent1"/>
+            </a:effectRef>
+            <a:fontRef idx="minor">
+              <a:schemeClr val="lt1"/>
+            </a:fontRef>
+          </p:style>
+          <p:txBody>
+            <a:bodyPr rtlCol="0" anchor="ctr"/>
+            <a:lstStyle/>
+            <a:p>
+              <a:pPr algn="ctr"/>
+              <a:r>
+                <a:rPr lang="en-US" dirty="0"/>
+                <a:t>SRFB</a:t>
+              </a:r>
+            </a:p>
+            <a:p>
+              <a:pPr algn="ctr"/>
+              <a:r>
+                <a:rPr lang="en-US" dirty="0"/>
+                <a:t>Grammar</a:t>
+              </a:r>
+            </a:p>
+          </p:txBody>
+        </p:sp>
+        <p:cxnSp>
+          <p:nvCxnSpPr>
+            <p:cNvPr id="30" name="Straight Arrow Connector 29"/>
+            <p:cNvCxnSpPr>
+              <a:stCxn id="26" idx="3"/>
+              <a:endCxn id="2" idx="1"/>
+            </p:cNvCxnSpPr>
+            <p:nvPr/>
+          </p:nvCxnSpPr>
+          <p:spPr>
+            <a:xfrm>
+              <a:off x="1298267" y="3300212"/>
+              <a:ext cx="176711" cy="0"/>
+            </a:xfrm>
+            <a:prstGeom prst="straightConnector1">
+              <a:avLst/>
+            </a:prstGeom>
+            <a:ln>
+              <a:tailEnd type="triangle"/>
+            </a:ln>
+          </p:spPr>
+          <p:style>
+            <a:lnRef idx="1">
+              <a:schemeClr val="accent1"/>
+            </a:lnRef>
+            <a:fillRef idx="0">
+              <a:schemeClr val="accent1"/>
+            </a:fillRef>
+            <a:effectRef idx="0">
+              <a:schemeClr val="accent1"/>
+            </a:effectRef>
+            <a:fontRef idx="minor">
+              <a:schemeClr val="tx1"/>
+            </a:fontRef>
+          </p:style>
+        </p:cxnSp>
+        <p:sp>
+          <p:nvSpPr>
+            <p:cNvPr id="40" name="Rectangle 39"/>
+            <p:cNvSpPr/>
+            <p:nvPr/>
+          </p:nvSpPr>
+          <p:spPr>
+            <a:xfrm>
+              <a:off x="3066537" y="812438"/>
+              <a:ext cx="1326525" cy="906303"/>
+            </a:xfrm>
+            <a:prstGeom prst="rect">
+              <a:avLst/>
+            </a:prstGeom>
+          </p:spPr>
+          <p:style>
+            <a:lnRef idx="2">
+              <a:schemeClr val="accent1">
+                <a:shade val="50000"/>
+              </a:schemeClr>
+            </a:lnRef>
+            <a:fillRef idx="1">
+              <a:schemeClr val="accent1"/>
+            </a:fillRef>
+            <a:effectRef idx="0">
+              <a:schemeClr val="accent1"/>
+            </a:effectRef>
+            <a:fontRef idx="minor">
+              <a:schemeClr val="lt1"/>
+            </a:fontRef>
+          </p:style>
+          <p:txBody>
+            <a:bodyPr rtlCol="0" anchor="ctr"/>
+            <a:lstStyle/>
+            <a:p>
+              <a:pPr algn="ctr"/>
+              <a:r>
+                <a:rPr lang="en-US" dirty="0"/>
+                <a:t>Syntax</a:t>
+              </a:r>
+            </a:p>
+            <a:p>
+              <a:pPr algn="ctr"/>
+              <a:r>
+                <a:rPr lang="en-US" dirty="0"/>
+                <a:t>graph</a:t>
+              </a:r>
+            </a:p>
+          </p:txBody>
+        </p:sp>
+        <p:cxnSp>
+          <p:nvCxnSpPr>
+            <p:cNvPr id="41" name="Straight Arrow Connector 40"/>
+            <p:cNvCxnSpPr>
+              <a:stCxn id="2" idx="3"/>
+              <a:endCxn id="40" idx="1"/>
+            </p:cNvCxnSpPr>
+            <p:nvPr/>
+          </p:nvCxnSpPr>
+          <p:spPr>
+            <a:xfrm flipV="1">
+              <a:off x="2578962" y="1265590"/>
+              <a:ext cx="487575" cy="2034622"/>
+            </a:xfrm>
+            <a:prstGeom prst="straightConnector1">
+              <a:avLst/>
+            </a:prstGeom>
+            <a:ln>
+              <a:tailEnd type="triangle"/>
+            </a:ln>
+          </p:spPr>
+          <p:style>
+            <a:lnRef idx="1">
+              <a:schemeClr val="accent1"/>
+            </a:lnRef>
+            <a:fillRef idx="0">
+              <a:schemeClr val="accent1"/>
+            </a:fillRef>
+            <a:effectRef idx="0">
+              <a:schemeClr val="accent1"/>
+            </a:effectRef>
+            <a:fontRef idx="minor">
+              <a:schemeClr val="tx1"/>
+            </a:fontRef>
+          </p:style>
+        </p:cxnSp>
+        <p:pic>
+          <p:nvPicPr>
+            <p:cNvPr id="45" name="Picture 44"/>
+            <p:cNvPicPr>
+              <a:picLocks noChangeAspect="1"/>
+            </p:cNvPicPr>
+            <p:nvPr/>
+          </p:nvPicPr>
+          <p:blipFill rotWithShape="1">
+            <a:blip r:embed="rId2">
+              <a:extLst>
+                <a:ext uri="{28A0092B-C50C-407E-A947-70E740481C1C}">
+                  <a14:useLocalDpi xmlns:a14="http://schemas.microsoft.com/office/drawing/2010/main" val="0"/>
+                </a:ext>
+              </a:extLst>
+            </a:blip>
+            <a:srcRect b="60121"/>
+            <a:stretch/>
+          </p:blipFill>
+          <p:spPr>
+            <a:xfrm>
+              <a:off x="4669155" y="536055"/>
+              <a:ext cx="3097260" cy="1459068"/>
+            </a:xfrm>
+            <a:prstGeom prst="rect">
+              <a:avLst/>
+            </a:prstGeom>
+          </p:spPr>
+        </p:pic>
+        <p:pic>
+          <p:nvPicPr>
+            <p:cNvPr id="46" name="Picture 45"/>
+            <p:cNvPicPr>
+              <a:picLocks noChangeAspect="1"/>
+            </p:cNvPicPr>
+            <p:nvPr/>
+          </p:nvPicPr>
+          <p:blipFill rotWithShape="1">
+            <a:blip r:embed="rId3">
+              <a:extLst>
+                <a:ext uri="{28A0092B-C50C-407E-A947-70E740481C1C}">
+                  <a14:useLocalDpi xmlns:a14="http://schemas.microsoft.com/office/drawing/2010/main" val="0"/>
+                </a:ext>
+              </a:extLst>
+            </a:blip>
+            <a:srcRect r="21720" b="54113"/>
+            <a:stretch/>
+          </p:blipFill>
+          <p:spPr>
+            <a:xfrm>
+              <a:off x="4930622" y="3517941"/>
+              <a:ext cx="2084976" cy="1478699"/>
+            </a:xfrm>
+            <a:prstGeom prst="rect">
+              <a:avLst/>
+            </a:prstGeom>
+          </p:spPr>
+        </p:pic>
+        <p:pic>
+          <p:nvPicPr>
+            <p:cNvPr id="47" name="Picture 46"/>
+            <p:cNvPicPr>
+              <a:picLocks noChangeAspect="1"/>
+            </p:cNvPicPr>
+            <p:nvPr/>
+          </p:nvPicPr>
+          <p:blipFill rotWithShape="1">
+            <a:blip r:embed="rId4">
+              <a:extLst>
+                <a:ext uri="{28A0092B-C50C-407E-A947-70E740481C1C}">
+                  <a14:useLocalDpi xmlns:a14="http://schemas.microsoft.com/office/drawing/2010/main" val="0"/>
+                </a:ext>
+              </a:extLst>
+            </a:blip>
+            <a:srcRect r="52917" b="33356"/>
+            <a:stretch/>
+          </p:blipFill>
+          <p:spPr>
+            <a:xfrm>
+              <a:off x="4557036" y="2152949"/>
+              <a:ext cx="3037054" cy="1083441"/>
+            </a:xfrm>
+            <a:prstGeom prst="rect">
+              <a:avLst/>
+            </a:prstGeom>
+          </p:spPr>
+        </p:pic>
+        <p:sp>
+          <p:nvSpPr>
+            <p:cNvPr id="50" name="Rectangle 49"/>
+            <p:cNvSpPr/>
+            <p:nvPr/>
+          </p:nvSpPr>
+          <p:spPr>
+            <a:xfrm>
+              <a:off x="4824202" y="5079968"/>
+              <a:ext cx="2437530" cy="1785104"/>
+            </a:xfrm>
+            <a:prstGeom prst="rect">
+              <a:avLst/>
+            </a:prstGeom>
+          </p:spPr>
+          <p:txBody>
+            <a:bodyPr wrap="square">
+              <a:spAutoFit/>
+            </a:bodyPr>
+            <a:lstStyle/>
+            <a:p>
+              <a:r>
+                <a:rPr lang="fr-FR" sz="1000" noProof="1"/>
+                <a:t>function RR_constant = Diagram.bind(this,</a:t>
+              </a:r>
+            </a:p>
+            <a:p>
+              <a:r>
+                <a:rPr lang="fr-FR" sz="1000" noProof="1"/>
+                <a:t>    Sequence.bind(this, Title.bind(this, "constant"),</a:t>
+              </a:r>
+            </a:p>
+            <a:p>
+              <a:r>
+                <a:rPr lang="fr-FR" sz="1000" noProof="1"/>
+                <a:t>        Terminal.bind(this, "/[+-]?[0-9]+/"),</a:t>
+              </a:r>
+            </a:p>
+            <a:p>
+              <a:r>
+                <a:rPr lang="fr-FR" sz="1000" noProof="1"/>
+                <a:t>        Comment.bind(this, "END constant")</a:t>
+              </a:r>
+            </a:p>
+            <a:p>
+              <a:r>
+                <a:rPr lang="fr-FR" sz="1000" noProof="1"/>
+                <a:t>    )</a:t>
+              </a:r>
+            </a:p>
+            <a:p>
+              <a:r>
+                <a:rPr lang="fr-FR" sz="1000" noProof="1"/>
+                <a:t>);</a:t>
+              </a:r>
+            </a:p>
+            <a:p>
+              <a:endParaRPr lang="fr-FR" sz="1000" noProof="1"/>
+            </a:p>
+            <a:p>
+              <a:r>
+                <a:rPr lang="fr-FR" sz="1000" noProof="1"/>
+                <a:t>function RR_expression = Diagram.bind(this,</a:t>
+              </a:r>
+            </a:p>
+            <a:p>
+              <a:r>
+                <a:rPr lang="fr-FR" sz="1000" noProof="1"/>
+                <a:t>…</a:t>
+              </a:r>
+            </a:p>
+          </p:txBody>
+        </p:sp>
+        <p:cxnSp>
+          <p:nvCxnSpPr>
+            <p:cNvPr id="51" name="Straight Arrow Connector 50"/>
+            <p:cNvCxnSpPr>
+              <a:stCxn id="40" idx="3"/>
+              <a:endCxn id="45" idx="1"/>
+            </p:cNvCxnSpPr>
+            <p:nvPr/>
+          </p:nvCxnSpPr>
+          <p:spPr>
+            <a:xfrm flipV="1">
+              <a:off x="4393062" y="1265589"/>
+              <a:ext cx="276093" cy="1"/>
+            </a:xfrm>
+            <a:prstGeom prst="straightConnector1">
+              <a:avLst/>
+            </a:prstGeom>
+            <a:ln>
+              <a:tailEnd type="triangle"/>
+            </a:ln>
+          </p:spPr>
+          <p:style>
+            <a:lnRef idx="1">
+              <a:schemeClr val="accent1"/>
+            </a:lnRef>
+            <a:fillRef idx="0">
+              <a:schemeClr val="accent1"/>
+            </a:fillRef>
+            <a:effectRef idx="0">
+              <a:schemeClr val="accent1"/>
+            </a:effectRef>
+            <a:fontRef idx="minor">
+              <a:schemeClr val="tx1"/>
+            </a:fontRef>
+          </p:style>
+        </p:cxnSp>
+        <p:cxnSp>
+          <p:nvCxnSpPr>
+            <p:cNvPr id="54" name="Straight Arrow Connector 53"/>
+            <p:cNvCxnSpPr>
+              <a:stCxn id="5" idx="3"/>
+              <a:endCxn id="46" idx="1"/>
+            </p:cNvCxnSpPr>
+            <p:nvPr/>
+          </p:nvCxnSpPr>
+          <p:spPr>
+            <a:xfrm flipV="1">
+              <a:off x="4418622" y="4257291"/>
+              <a:ext cx="512000" cy="3904"/>
+            </a:xfrm>
+            <a:prstGeom prst="straightConnector1">
+              <a:avLst/>
+            </a:prstGeom>
+            <a:ln>
+              <a:tailEnd type="triangle"/>
+            </a:ln>
+          </p:spPr>
+          <p:style>
+            <a:lnRef idx="1">
+              <a:schemeClr val="accent1"/>
+            </a:lnRef>
+            <a:fillRef idx="0">
+              <a:schemeClr val="accent1"/>
+            </a:fillRef>
+            <a:effectRef idx="0">
+              <a:schemeClr val="accent1"/>
+            </a:effectRef>
+            <a:fontRef idx="minor">
+              <a:schemeClr val="tx1"/>
+            </a:fontRef>
+          </p:style>
+        </p:cxnSp>
+        <p:cxnSp>
+          <p:nvCxnSpPr>
+            <p:cNvPr id="57" name="Straight Arrow Connector 56"/>
+            <p:cNvCxnSpPr>
+              <a:stCxn id="9" idx="3"/>
+              <a:endCxn id="47" idx="1"/>
+            </p:cNvCxnSpPr>
+            <p:nvPr/>
+          </p:nvCxnSpPr>
+          <p:spPr>
+            <a:xfrm>
+              <a:off x="4393062" y="2691535"/>
+              <a:ext cx="163974" cy="3135"/>
+            </a:xfrm>
+            <a:prstGeom prst="straightConnector1">
+              <a:avLst/>
+            </a:prstGeom>
+            <a:ln>
+              <a:tailEnd type="triangle"/>
+            </a:ln>
+          </p:spPr>
+          <p:style>
+            <a:lnRef idx="1">
+              <a:schemeClr val="accent1"/>
+            </a:lnRef>
+            <a:fillRef idx="0">
+              <a:schemeClr val="accent1"/>
+            </a:fillRef>
+            <a:effectRef idx="0">
+              <a:schemeClr val="accent1"/>
+            </a:effectRef>
+            <a:fontRef idx="minor">
+              <a:schemeClr val="tx1"/>
+            </a:fontRef>
+          </p:style>
+        </p:cxnSp>
+        <p:cxnSp>
+          <p:nvCxnSpPr>
+            <p:cNvPr id="60" name="Straight Arrow Connector 59"/>
+            <p:cNvCxnSpPr>
+              <a:stCxn id="14" idx="3"/>
+              <a:endCxn id="50" idx="1"/>
+            </p:cNvCxnSpPr>
+            <p:nvPr/>
+          </p:nvCxnSpPr>
+          <p:spPr>
+            <a:xfrm>
+              <a:off x="4407689" y="5794616"/>
+              <a:ext cx="416513" cy="177904"/>
+            </a:xfrm>
+            <a:prstGeom prst="straightConnector1">
+              <a:avLst/>
+            </a:prstGeom>
+            <a:ln>
+              <a:tailEnd type="triangle"/>
+            </a:ln>
+          </p:spPr>
+          <p:style>
+            <a:lnRef idx="1">
+              <a:schemeClr val="accent1"/>
+            </a:lnRef>
+            <a:fillRef idx="0">
+              <a:schemeClr val="accent1"/>
+            </a:fillRef>
+            <a:effectRef idx="0">
+              <a:schemeClr val="accent1"/>
+            </a:effectRef>
+            <a:fontRef idx="minor">
+              <a:schemeClr val="tx1"/>
+            </a:fontRef>
+          </p:style>
+        </p:cxnSp>
+        <p:sp>
+          <p:nvSpPr>
+            <p:cNvPr id="63" name="TextBox 62"/>
+            <p:cNvSpPr txBox="1"/>
+            <p:nvPr/>
+          </p:nvSpPr>
+          <p:spPr>
+            <a:xfrm>
+              <a:off x="949772" y="102486"/>
+              <a:ext cx="1626023" cy="646331"/>
+            </a:xfrm>
+            <a:prstGeom prst="rect">
+              <a:avLst/>
+            </a:prstGeom>
+            <a:noFill/>
+          </p:spPr>
+          <p:txBody>
+            <a:bodyPr wrap="none" rtlCol="0">
+              <a:spAutoFit/>
+            </a:bodyPr>
+            <a:lstStyle/>
+            <a:p>
+              <a:pPr algn="ctr"/>
+              <a:r>
+                <a:rPr lang="en-US" b="1" dirty="0"/>
+                <a:t>Grammar </a:t>
+              </a:r>
+            </a:p>
+            <a:p>
+              <a:pPr algn="ctr"/>
+              <a:r>
+                <a:rPr lang="en-US" b="1" dirty="0"/>
+                <a:t>transformation</a:t>
+              </a:r>
+            </a:p>
+          </p:txBody>
+        </p:sp>
+        <p:sp>
+          <p:nvSpPr>
+            <p:cNvPr id="78" name="TextBox 77"/>
+            <p:cNvSpPr txBox="1"/>
+            <p:nvPr/>
+          </p:nvSpPr>
+          <p:spPr>
+            <a:xfrm>
+              <a:off x="9053417" y="102485"/>
+              <a:ext cx="1259319" cy="646331"/>
+            </a:xfrm>
+            <a:prstGeom prst="rect">
+              <a:avLst/>
+            </a:prstGeom>
+            <a:noFill/>
+          </p:spPr>
+          <p:txBody>
+            <a:bodyPr wrap="none" rtlCol="0">
+              <a:spAutoFit/>
+            </a:bodyPr>
+            <a:lstStyle/>
+            <a:p>
+              <a:pPr algn="ctr"/>
+              <a:r>
+                <a:rPr lang="en-US" b="1" dirty="0"/>
+                <a:t>Expression </a:t>
+              </a:r>
+            </a:p>
+            <a:p>
+              <a:pPr algn="ctr"/>
+              <a:r>
+                <a:rPr lang="en-US" b="1" dirty="0"/>
+                <a:t>validation</a:t>
+              </a:r>
+            </a:p>
+          </p:txBody>
+        </p:sp>
+        <p:sp>
+          <p:nvSpPr>
+            <p:cNvPr id="104" name="Rectangle 103"/>
+            <p:cNvSpPr/>
+            <p:nvPr/>
+          </p:nvSpPr>
+          <p:spPr>
+            <a:xfrm>
+              <a:off x="8986212" y="3587137"/>
+              <a:ext cx="1326525" cy="906303"/>
+            </a:xfrm>
+            <a:prstGeom prst="rect">
+              <a:avLst/>
+            </a:prstGeom>
+          </p:spPr>
+          <p:style>
+            <a:lnRef idx="2">
+              <a:schemeClr val="accent1">
+                <a:shade val="50000"/>
+              </a:schemeClr>
+            </a:lnRef>
+            <a:fillRef idx="1">
+              <a:schemeClr val="accent1"/>
+            </a:fillRef>
+            <a:effectRef idx="0">
+              <a:schemeClr val="accent1"/>
+            </a:effectRef>
+            <a:fontRef idx="minor">
+              <a:schemeClr val="lt1"/>
+            </a:fontRef>
+          </p:style>
+          <p:txBody>
+            <a:bodyPr rtlCol="0" anchor="ctr"/>
+            <a:lstStyle/>
+            <a:p>
+              <a:pPr algn="ctr"/>
+              <a:r>
+                <a:rPr lang="en-US" dirty="0"/>
+                <a:t>Tree</a:t>
+              </a:r>
+            </a:p>
+            <a:p>
+              <a:pPr algn="ctr"/>
+              <a:r>
+                <a:rPr lang="en-US" dirty="0"/>
+                <a:t>Walker</a:t>
+              </a:r>
+            </a:p>
+          </p:txBody>
+        </p:sp>
+        <p:sp>
+          <p:nvSpPr>
+            <p:cNvPr id="105" name="Rectangle 104"/>
+            <p:cNvSpPr/>
+            <p:nvPr/>
+          </p:nvSpPr>
+          <p:spPr>
+            <a:xfrm>
+              <a:off x="8000202" y="1871908"/>
+              <a:ext cx="1326525" cy="906303"/>
+            </a:xfrm>
+            <a:prstGeom prst="rect">
+              <a:avLst/>
+            </a:prstGeom>
+          </p:spPr>
+          <p:style>
+            <a:lnRef idx="2">
+              <a:schemeClr val="accent1">
+                <a:shade val="50000"/>
+              </a:schemeClr>
+            </a:lnRef>
+            <a:fillRef idx="1">
+              <a:schemeClr val="accent1"/>
+            </a:fillRef>
+            <a:effectRef idx="0">
+              <a:schemeClr val="accent1"/>
+            </a:effectRef>
+            <a:fontRef idx="minor">
+              <a:schemeClr val="lt1"/>
+            </a:fontRef>
+          </p:style>
+          <p:txBody>
+            <a:bodyPr rtlCol="0" anchor="ctr"/>
+            <a:lstStyle/>
+            <a:p>
+              <a:pPr algn="ctr"/>
+              <a:r>
+                <a:rPr lang="en-US" dirty="0"/>
+                <a:t>Tokenized</a:t>
+              </a:r>
+            </a:p>
+            <a:p>
+              <a:pPr algn="ctr"/>
+              <a:r>
+                <a:rPr lang="en-US" dirty="0"/>
+                <a:t>expression</a:t>
+              </a:r>
+            </a:p>
+          </p:txBody>
+        </p:sp>
+        <p:sp>
+          <p:nvSpPr>
+            <p:cNvPr id="106" name="Rectangle 105"/>
+            <p:cNvSpPr/>
+            <p:nvPr/>
+          </p:nvSpPr>
+          <p:spPr>
+            <a:xfrm>
+              <a:off x="8986211" y="5066217"/>
+              <a:ext cx="1326525" cy="906303"/>
+            </a:xfrm>
+            <a:prstGeom prst="rect">
+              <a:avLst/>
+            </a:prstGeom>
+          </p:spPr>
+          <p:style>
+            <a:lnRef idx="2">
+              <a:schemeClr val="accent1">
+                <a:shade val="50000"/>
+              </a:schemeClr>
+            </a:lnRef>
+            <a:fillRef idx="1">
+              <a:schemeClr val="accent1"/>
+            </a:fillRef>
+            <a:effectRef idx="0">
+              <a:schemeClr val="accent1"/>
+            </a:effectRef>
+            <a:fontRef idx="minor">
+              <a:schemeClr val="lt1"/>
+            </a:fontRef>
+          </p:style>
+          <p:txBody>
+            <a:bodyPr rtlCol="0" anchor="ctr"/>
+            <a:lstStyle/>
+            <a:p>
+              <a:pPr algn="ctr"/>
+              <a:r>
+                <a:rPr lang="en-US" dirty="0"/>
+                <a:t>Validating</a:t>
+              </a:r>
+            </a:p>
+            <a:p>
+              <a:pPr algn="ctr"/>
+              <a:r>
+                <a:rPr lang="en-US" dirty="0"/>
+                <a:t>function</a:t>
+              </a:r>
+            </a:p>
+          </p:txBody>
+        </p:sp>
+        <p:cxnSp>
+          <p:nvCxnSpPr>
+            <p:cNvPr id="108" name="Elbow Connector 107"/>
+            <p:cNvCxnSpPr>
+              <a:stCxn id="105" idx="2"/>
+              <a:endCxn id="104" idx="1"/>
+            </p:cNvCxnSpPr>
+            <p:nvPr/>
+          </p:nvCxnSpPr>
+          <p:spPr>
+            <a:xfrm rot="16200000" flipH="1">
+              <a:off x="8193799" y="3247876"/>
+              <a:ext cx="1262078" cy="322747"/>
+            </a:xfrm>
+            <a:prstGeom prst="bentConnector2">
+              <a:avLst/>
+            </a:prstGeom>
+            <a:ln>
+              <a:tailEnd type="triangle"/>
+            </a:ln>
+          </p:spPr>
+          <p:style>
+            <a:lnRef idx="1">
+              <a:schemeClr val="accent1"/>
+            </a:lnRef>
+            <a:fillRef idx="0">
+              <a:schemeClr val="accent1"/>
+            </a:fillRef>
+            <a:effectRef idx="0">
+              <a:schemeClr val="accent1"/>
+            </a:effectRef>
+            <a:fontRef idx="minor">
+              <a:schemeClr val="tx1"/>
+            </a:fontRef>
+          </p:style>
+        </p:cxnSp>
+        <p:cxnSp>
+          <p:nvCxnSpPr>
+            <p:cNvPr id="110" name="Elbow Connector 109"/>
+            <p:cNvCxnSpPr>
+              <a:stCxn id="105" idx="2"/>
+              <a:endCxn id="106" idx="1"/>
+            </p:cNvCxnSpPr>
+            <p:nvPr/>
+          </p:nvCxnSpPr>
+          <p:spPr>
+            <a:xfrm rot="16200000" flipH="1">
+              <a:off x="7454259" y="3987417"/>
+              <a:ext cx="2741158" cy="322746"/>
+            </a:xfrm>
+            <a:prstGeom prst="bentConnector2">
+              <a:avLst/>
+            </a:prstGeom>
+            <a:ln>
+              <a:tailEnd type="triangle"/>
+            </a:ln>
+          </p:spPr>
+          <p:style>
+            <a:lnRef idx="1">
+              <a:schemeClr val="accent1"/>
+            </a:lnRef>
+            <a:fillRef idx="0">
+              <a:schemeClr val="accent1"/>
+            </a:fillRef>
+            <a:effectRef idx="0">
+              <a:schemeClr val="accent1"/>
+            </a:effectRef>
+            <a:fontRef idx="minor">
+              <a:schemeClr val="tx1"/>
+            </a:fontRef>
+          </p:style>
+        </p:cxnSp>
+        <p:sp>
+          <p:nvSpPr>
+            <p:cNvPr id="111" name="TextBox 110"/>
+            <p:cNvSpPr txBox="1"/>
+            <p:nvPr/>
+          </p:nvSpPr>
+          <p:spPr>
+            <a:xfrm>
+              <a:off x="8969409" y="3313769"/>
+              <a:ext cx="1125629" cy="246221"/>
+            </a:xfrm>
+            <a:prstGeom prst="rect">
+              <a:avLst/>
+            </a:prstGeom>
+            <a:noFill/>
+          </p:spPr>
+          <p:txBody>
+            <a:bodyPr wrap="none" rtlCol="0">
+              <a:spAutoFit/>
+            </a:bodyPr>
+            <a:lstStyle/>
+            <a:p>
+              <a:r>
+                <a:rPr lang="fr-FR" sz="1000" noProof="1"/>
+                <a:t>{validating:”tree”}</a:t>
+              </a:r>
+            </a:p>
+          </p:txBody>
+        </p:sp>
+        <p:sp>
+          <p:nvSpPr>
+            <p:cNvPr id="112" name="TextBox 111"/>
+            <p:cNvSpPr txBox="1"/>
+            <p:nvPr/>
+          </p:nvSpPr>
+          <p:spPr>
+            <a:xfrm>
+              <a:off x="8935496" y="4823480"/>
+              <a:ext cx="1343638" cy="246221"/>
+            </a:xfrm>
+            <a:prstGeom prst="rect">
+              <a:avLst/>
+            </a:prstGeom>
+            <a:noFill/>
+          </p:spPr>
+          <p:txBody>
+            <a:bodyPr wrap="none" rtlCol="0">
+              <a:spAutoFit/>
+            </a:bodyPr>
+            <a:lstStyle/>
+            <a:p>
+              <a:r>
+                <a:rPr lang="fr-FR" sz="1000" noProof="1"/>
+                <a:t>{validating:”function”}</a:t>
+              </a:r>
+            </a:p>
+          </p:txBody>
+        </p:sp>
+        <p:sp>
+          <p:nvSpPr>
+            <p:cNvPr id="146" name="Rectangle 145"/>
+            <p:cNvSpPr/>
+            <p:nvPr/>
+          </p:nvSpPr>
+          <p:spPr>
+            <a:xfrm>
+              <a:off x="7538205" y="5249245"/>
+              <a:ext cx="773282" cy="1446550"/>
+            </a:xfrm>
+            <a:prstGeom prst="rect">
+              <a:avLst/>
+            </a:prstGeom>
+          </p:spPr>
+          <p:txBody>
+            <a:bodyPr wrap="square">
+              <a:spAutoFit/>
+            </a:bodyPr>
+            <a:lstStyle/>
+            <a:p>
+              <a:r>
+                <a:rPr lang="fr-BE" sz="800" noProof="1"/>
+                <a:t>Diagram</a:t>
+              </a:r>
+            </a:p>
+            <a:p>
+              <a:r>
+                <a:rPr lang="fr-BE" sz="800" noProof="1"/>
+                <a:t>Sequence</a:t>
+              </a:r>
+            </a:p>
+            <a:p>
+              <a:r>
+                <a:rPr lang="fr-BE" sz="800" noProof="1"/>
+                <a:t>Stack</a:t>
+              </a:r>
+            </a:p>
+            <a:p>
+              <a:r>
+                <a:rPr lang="fr-BE" sz="800" noProof="1"/>
+                <a:t>Choice</a:t>
+              </a:r>
+            </a:p>
+            <a:p>
+              <a:r>
+                <a:rPr lang="fr-BE" sz="800" noProof="1"/>
+                <a:t>Optional</a:t>
+              </a:r>
+            </a:p>
+            <a:p>
+              <a:r>
+                <a:rPr lang="fr-BE" sz="800" noProof="1"/>
+                <a:t>OneOrMore</a:t>
+              </a:r>
+            </a:p>
+            <a:p>
+              <a:r>
+                <a:rPr lang="fr-BE" sz="800" noProof="1"/>
+                <a:t>ZeroOrMore</a:t>
+              </a:r>
+            </a:p>
+            <a:p>
+              <a:r>
+                <a:rPr lang="fr-BE" sz="800" noProof="1"/>
+                <a:t>Terminal</a:t>
+              </a:r>
+            </a:p>
+            <a:p>
+              <a:r>
+                <a:rPr lang="fr-BE" sz="800" noProof="1"/>
+                <a:t>NonTerminal</a:t>
+              </a:r>
+            </a:p>
+            <a:p>
+              <a:r>
+                <a:rPr lang="fr-BE" sz="800" noProof="1"/>
+                <a:t>Comment</a:t>
+              </a:r>
+            </a:p>
+            <a:p>
+              <a:r>
+                <a:rPr lang="fr-BE" sz="800" noProof="1"/>
+                <a:t>Skip</a:t>
+              </a:r>
+            </a:p>
+          </p:txBody>
+        </p:sp>
+        <p:cxnSp>
+          <p:nvCxnSpPr>
+            <p:cNvPr id="149" name="Straight Arrow Connector 148"/>
+            <p:cNvCxnSpPr>
+              <a:stCxn id="50" idx="3"/>
+              <a:endCxn id="146" idx="1"/>
+            </p:cNvCxnSpPr>
+            <p:nvPr/>
+          </p:nvCxnSpPr>
+          <p:spPr>
+            <a:xfrm>
+              <a:off x="7261732" y="5972520"/>
+              <a:ext cx="276473" cy="0"/>
+            </a:xfrm>
+            <a:prstGeom prst="straightConnector1">
+              <a:avLst/>
+            </a:prstGeom>
+            <a:ln>
+              <a:tailEnd type="triangle"/>
+            </a:ln>
+          </p:spPr>
+          <p:style>
+            <a:lnRef idx="1">
+              <a:schemeClr val="accent1"/>
+            </a:lnRef>
+            <a:fillRef idx="0">
+              <a:schemeClr val="accent1"/>
+            </a:fillRef>
+            <a:effectRef idx="0">
+              <a:schemeClr val="accent1"/>
+            </a:effectRef>
+            <a:fontRef idx="minor">
+              <a:schemeClr val="tx1"/>
+            </a:fontRef>
+          </p:style>
+        </p:cxnSp>
+        <p:cxnSp>
+          <p:nvCxnSpPr>
+            <p:cNvPr id="157" name="Straight Arrow Connector 156"/>
+            <p:cNvCxnSpPr>
+              <a:stCxn id="146" idx="3"/>
+              <a:endCxn id="106" idx="1"/>
+            </p:cNvCxnSpPr>
+            <p:nvPr/>
+          </p:nvCxnSpPr>
+          <p:spPr>
+            <a:xfrm flipV="1">
+              <a:off x="8311487" y="5519369"/>
+              <a:ext cx="674724" cy="453151"/>
+            </a:xfrm>
+            <a:prstGeom prst="straightConnector1">
+              <a:avLst/>
+            </a:prstGeom>
+            <a:ln>
+              <a:tailEnd type="triangle"/>
+            </a:ln>
+          </p:spPr>
+          <p:style>
+            <a:lnRef idx="1">
+              <a:schemeClr val="accent1"/>
+            </a:lnRef>
+            <a:fillRef idx="0">
+              <a:schemeClr val="accent1"/>
+            </a:fillRef>
+            <a:effectRef idx="0">
+              <a:schemeClr val="accent1"/>
+            </a:effectRef>
+            <a:fontRef idx="minor">
+              <a:schemeClr val="tx1"/>
+            </a:fontRef>
+          </p:style>
+        </p:cxnSp>
+        <p:cxnSp>
+          <p:nvCxnSpPr>
+            <p:cNvPr id="160" name="Straight Arrow Connector 159"/>
+            <p:cNvCxnSpPr>
+              <a:stCxn id="46" idx="3"/>
+              <a:endCxn id="104" idx="1"/>
+            </p:cNvCxnSpPr>
+            <p:nvPr/>
+          </p:nvCxnSpPr>
+          <p:spPr>
+            <a:xfrm flipV="1">
+              <a:off x="7015598" y="4040289"/>
+              <a:ext cx="1970614" cy="217002"/>
+            </a:xfrm>
+            <a:prstGeom prst="straightConnector1">
+              <a:avLst/>
+            </a:prstGeom>
+            <a:ln>
+              <a:tailEnd type="triangle"/>
+            </a:ln>
+          </p:spPr>
+          <p:style>
+            <a:lnRef idx="1">
+              <a:schemeClr val="accent1"/>
+            </a:lnRef>
+            <a:fillRef idx="0">
+              <a:schemeClr val="accent1"/>
+            </a:fillRef>
+            <a:effectRef idx="0">
+              <a:schemeClr val="accent1"/>
+            </a:effectRef>
+            <a:fontRef idx="minor">
+              <a:schemeClr val="tx1"/>
+            </a:fontRef>
+          </p:style>
+        </p:cxnSp>
+        <p:sp>
+          <p:nvSpPr>
+            <p:cNvPr id="169" name="Flowchart: Terminator 168"/>
+            <p:cNvSpPr/>
+            <p:nvPr/>
+          </p:nvSpPr>
+          <p:spPr>
+            <a:xfrm>
+              <a:off x="3092097" y="249928"/>
+              <a:ext cx="1185598" cy="323165"/>
+            </a:xfrm>
+            <a:prstGeom prst="flowChartTerminator">
+              <a:avLst/>
+            </a:prstGeom>
+            <a:solidFill>
+              <a:srgbClr val="FFC000"/>
+            </a:solidFill>
+            <a:ln>
+              <a:solidFill>
+                <a:srgbClr val="FFC000"/>
+              </a:solidFill>
+            </a:ln>
+          </p:spPr>
+          <p:style>
+            <a:lnRef idx="2">
+              <a:schemeClr val="accent1">
+                <a:shade val="50000"/>
+              </a:schemeClr>
+            </a:lnRef>
+            <a:fillRef idx="1">
+              <a:schemeClr val="accent1"/>
+            </a:fillRef>
+            <a:effectRef idx="0">
+              <a:schemeClr val="accent1"/>
+            </a:effectRef>
+            <a:fontRef idx="minor">
+              <a:schemeClr val="lt1"/>
+            </a:fontRef>
+          </p:style>
+          <p:txBody>
+            <a:bodyPr rtlCol="0" anchor="ctr"/>
+            <a:lstStyle/>
+            <a:p>
+              <a:pPr algn="ctr"/>
+              <a:r>
+                <a:rPr lang="en-US" dirty="0"/>
+                <a:t>refresh</a:t>
+              </a:r>
+            </a:p>
+          </p:txBody>
+        </p:sp>
+        <p:sp>
+          <p:nvSpPr>
+            <p:cNvPr id="170" name="Flowchart: Terminator 169"/>
+            <p:cNvSpPr/>
+            <p:nvPr/>
+          </p:nvSpPr>
+          <p:spPr>
+            <a:xfrm>
+              <a:off x="10327223" y="264067"/>
+              <a:ext cx="1185598" cy="323165"/>
+            </a:xfrm>
+            <a:prstGeom prst="flowChartTerminator">
+              <a:avLst/>
+            </a:prstGeom>
+            <a:solidFill>
+              <a:srgbClr val="FFC000"/>
+            </a:solidFill>
+            <a:ln>
+              <a:solidFill>
+                <a:srgbClr val="FFC000"/>
+              </a:solidFill>
+            </a:ln>
+          </p:spPr>
+          <p:style>
+            <a:lnRef idx="2">
+              <a:schemeClr val="accent1">
+                <a:shade val="50000"/>
+              </a:schemeClr>
+            </a:lnRef>
+            <a:fillRef idx="1">
+              <a:schemeClr val="accent1"/>
+            </a:fillRef>
+            <a:effectRef idx="0">
+              <a:schemeClr val="accent1"/>
+            </a:effectRef>
+            <a:fontRef idx="minor">
+              <a:schemeClr val="lt1"/>
+            </a:fontRef>
+          </p:style>
+          <p:txBody>
+            <a:bodyPr rtlCol="0" anchor="ctr"/>
+            <a:lstStyle/>
+            <a:p>
+              <a:pPr algn="ctr"/>
+              <a:r>
+                <a:rPr lang="en-US" dirty="0"/>
+                <a:t>validate</a:t>
+              </a:r>
+            </a:p>
+          </p:txBody>
+        </p:sp>
+        <p:cxnSp>
+          <p:nvCxnSpPr>
+            <p:cNvPr id="178" name="Straight Arrow Connector 177"/>
+            <p:cNvCxnSpPr>
+              <a:stCxn id="106" idx="3"/>
+              <a:endCxn id="182" idx="1"/>
+            </p:cNvCxnSpPr>
+            <p:nvPr/>
+          </p:nvCxnSpPr>
+          <p:spPr>
+            <a:xfrm flipV="1">
+              <a:off x="10312736" y="5519368"/>
+              <a:ext cx="283847" cy="1"/>
+            </a:xfrm>
+            <a:prstGeom prst="straightConnector1">
+              <a:avLst/>
+            </a:prstGeom>
+            <a:ln>
+              <a:tailEnd type="triangle"/>
+            </a:ln>
+          </p:spPr>
+          <p:style>
+            <a:lnRef idx="1">
+              <a:schemeClr val="accent1"/>
+            </a:lnRef>
+            <a:fillRef idx="0">
+              <a:schemeClr val="accent1"/>
+            </a:fillRef>
+            <a:effectRef idx="0">
+              <a:schemeClr val="accent1"/>
+            </a:effectRef>
+            <a:fontRef idx="minor">
+              <a:schemeClr val="tx1"/>
+            </a:fontRef>
+          </p:style>
+        </p:cxnSp>
+        <p:cxnSp>
+          <p:nvCxnSpPr>
+            <p:cNvPr id="179" name="Straight Arrow Connector 178"/>
+            <p:cNvCxnSpPr>
+              <a:stCxn id="104" idx="3"/>
+              <a:endCxn id="185" idx="1"/>
+            </p:cNvCxnSpPr>
+            <p:nvPr/>
+          </p:nvCxnSpPr>
+          <p:spPr>
+            <a:xfrm flipV="1">
+              <a:off x="10312737" y="2923529"/>
+              <a:ext cx="283846" cy="1116760"/>
+            </a:xfrm>
+            <a:prstGeom prst="straightConnector1">
+              <a:avLst/>
+            </a:prstGeom>
+            <a:ln>
+              <a:tailEnd type="triangle"/>
+            </a:ln>
+          </p:spPr>
+          <p:style>
+            <a:lnRef idx="1">
+              <a:schemeClr val="accent1"/>
+            </a:lnRef>
+            <a:fillRef idx="0">
+              <a:schemeClr val="accent1"/>
+            </a:fillRef>
+            <a:effectRef idx="0">
+              <a:schemeClr val="accent1"/>
+            </a:effectRef>
+            <a:fontRef idx="minor">
+              <a:schemeClr val="tx1"/>
+            </a:fontRef>
+          </p:style>
+        </p:cxnSp>
+        <p:pic>
+          <p:nvPicPr>
+            <p:cNvPr id="182" name="Picture 181"/>
+            <p:cNvPicPr>
+              <a:picLocks noChangeAspect="1"/>
+            </p:cNvPicPr>
+            <p:nvPr/>
+          </p:nvPicPr>
+          <p:blipFill rotWithShape="1">
+            <a:blip r:embed="rId5">
+              <a:extLst>
+                <a:ext uri="{28A0092B-C50C-407E-A947-70E740481C1C}">
+                  <a14:useLocalDpi xmlns:a14="http://schemas.microsoft.com/office/drawing/2010/main" val="0"/>
+                </a:ext>
+              </a:extLst>
+            </a:blip>
+            <a:srcRect/>
+            <a:stretch/>
+          </p:blipFill>
+          <p:spPr>
+            <a:xfrm>
+              <a:off x="10596583" y="4779829"/>
+              <a:ext cx="1570705" cy="1479078"/>
+            </a:xfrm>
+            <a:prstGeom prst="rect">
+              <a:avLst/>
+            </a:prstGeom>
+          </p:spPr>
+        </p:pic>
+        <p:pic>
+          <p:nvPicPr>
+            <p:cNvPr id="185" name="Picture 184"/>
+            <p:cNvPicPr>
+              <a:picLocks noChangeAspect="1"/>
+            </p:cNvPicPr>
+            <p:nvPr/>
+          </p:nvPicPr>
+          <p:blipFill rotWithShape="1">
+            <a:blip r:embed="rId6">
+              <a:extLst>
+                <a:ext uri="{28A0092B-C50C-407E-A947-70E740481C1C}">
+                  <a14:useLocalDpi xmlns:a14="http://schemas.microsoft.com/office/drawing/2010/main" val="0"/>
+                </a:ext>
+              </a:extLst>
+            </a:blip>
+            <a:srcRect/>
+            <a:stretch/>
+          </p:blipFill>
+          <p:spPr>
+            <a:xfrm>
+              <a:off x="10596583" y="1900947"/>
+              <a:ext cx="1493633" cy="2045164"/>
+            </a:xfrm>
+            <a:prstGeom prst="rect">
+              <a:avLst/>
+            </a:prstGeom>
+          </p:spPr>
+        </p:pic>
+      </p:grpSp>
+    </p:spTree>
+    <p:extLst>
+      <p:ext uri="{BB962C8B-B14F-4D97-AF65-F5344CB8AC3E}">
+        <p14:creationId xmlns:p14="http://schemas.microsoft.com/office/powerpoint/2010/main" val="1637435199"/>
+      </p:ext>
+    </p:extLst>
+  </p:cSld>
+  <p:clrMapOvr>
+    <a:masterClrMapping/>
+  </p:clrMapOvr>
+</p:sld>
+</file>
+
+<file path=ppt/slides/slide4.xml><?xml version="1.0" encoding="utf-8"?>
+<p:sld xmlns:a="http://schemas.openxmlformats.org/drawingml/2006/main" xmlns:r="http://schemas.openxmlformats.org/officeDocument/2006/relationships" xmlns:p="http://schemas.openxmlformats.org/presentationml/2006/main">
+  <p:cSld>
+    <p:spTree>
+      <p:nvGrpSpPr>
+        <p:cNvPr id="1" name=""/>
+        <p:cNvGrpSpPr/>
+        <p:nvPr/>
+      </p:nvGrpSpPr>
+      <p:grpSpPr>
+        <a:xfrm>
+          <a:off x="0" y="0"/>
+          <a:ext cx="0" cy="0"/>
+          <a:chOff x="0" y="0"/>
+          <a:chExt cx="0" cy="0"/>
+        </a:xfrm>
+      </p:grpSpPr>
+      <p:sp>
+        <p:nvSpPr>
+          <p:cNvPr id="3" name="Rectangle 2"/>
+          <p:cNvSpPr/>
+          <p:nvPr/>
+        </p:nvSpPr>
+        <p:spPr>
+          <a:xfrm>
+            <a:off x="1874293" y="95748"/>
+            <a:ext cx="2315570" cy="6617196"/>
+          </a:xfrm>
+          <a:prstGeom prst="rect">
+            <a:avLst/>
+          </a:prstGeom>
+        </p:spPr>
+        <p:txBody>
+          <a:bodyPr wrap="square">
+            <a:spAutoFit/>
+          </a:bodyPr>
+          <a:lstStyle/>
+          <a:p>
+            <a:r>
+              <a:rPr lang="fr-FR" sz="800" noProof="1"/>
+              <a:t>function RR_constant = Diagram.bind(this,</a:t>
+            </a:r>
+          </a:p>
+          <a:p>
+            <a:r>
+              <a:rPr lang="fr-FR" sz="800" noProof="1"/>
+              <a:t>    Sequence.bind(this, Title.bind(this, "constant"),</a:t>
+            </a:r>
+          </a:p>
+          <a:p>
+            <a:r>
+              <a:rPr lang="fr-FR" sz="800" noProof="1"/>
+              <a:t>        Terminal.bind(this, "/[+-]?[0-9]+/"),</a:t>
+            </a:r>
+          </a:p>
+          <a:p>
+            <a:r>
+              <a:rPr lang="fr-FR" sz="800" noProof="1"/>
+              <a:t>        Comment.bind(this, "END constant")</a:t>
+            </a:r>
+          </a:p>
+          <a:p>
+            <a:r>
+              <a:rPr lang="fr-FR" sz="800" noProof="1"/>
+              <a:t>    )</a:t>
+            </a:r>
+          </a:p>
+          <a:p>
+            <a:r>
+              <a:rPr lang="fr-FR" sz="800" noProof="1"/>
+              <a:t>);</a:t>
+            </a:r>
+          </a:p>
+          <a:p>
+            <a:endParaRPr lang="fr-FR" sz="800" noProof="1"/>
+          </a:p>
+          <a:p>
+            <a:r>
+              <a:rPr lang="fr-FR" sz="800" noProof="1"/>
+              <a:t>function RR_expression = Diagram.bind(this,</a:t>
+            </a:r>
+          </a:p>
+          <a:p>
+            <a:r>
+              <a:rPr lang="fr-FR" sz="800" noProof="1"/>
+              <a:t>    Sequence.bind(this,</a:t>
+            </a:r>
+          </a:p>
+          <a:p>
+            <a:r>
+              <a:rPr lang="fr-FR" sz="800" noProof="1"/>
+              <a:t>        Title.bind(this, "expression"),</a:t>
+            </a:r>
+          </a:p>
+          <a:p>
+            <a:r>
+              <a:rPr lang="fr-FR" sz="800" noProof="1"/>
+              <a:t>        OneOrMore.bind(this,</a:t>
+            </a:r>
+          </a:p>
+          <a:p>
+            <a:r>
+              <a:rPr lang="fr-FR" sz="800" noProof="1"/>
+              <a:t>            NonTerminal.bind(this, "term"),</a:t>
+            </a:r>
+          </a:p>
+          <a:p>
+            <a:r>
+              <a:rPr lang="fr-FR" sz="800" noProof="1"/>
+              <a:t>            Terminal.bind(this, "+")),</a:t>
+            </a:r>
+          </a:p>
+          <a:p>
+            <a:r>
+              <a:rPr lang="fr-FR" sz="800" noProof="1"/>
+              <a:t>        Comment.bind(this, "END expression")</a:t>
+            </a:r>
+          </a:p>
+          <a:p>
+            <a:r>
+              <a:rPr lang="fr-FR" sz="800" noProof="1"/>
+              <a:t>    )</a:t>
+            </a:r>
+          </a:p>
+          <a:p>
+            <a:r>
+              <a:rPr lang="fr-FR" sz="800" noProof="1"/>
+              <a:t>);</a:t>
+            </a:r>
+          </a:p>
+          <a:p>
+            <a:endParaRPr lang="fr-FR" sz="800" noProof="1"/>
+          </a:p>
+          <a:p>
+            <a:r>
+              <a:rPr lang="fr-FR" sz="800" noProof="1"/>
+              <a:t>function RR_factor = Diagram.bind(this,</a:t>
+            </a:r>
+          </a:p>
+          <a:p>
+            <a:r>
+              <a:rPr lang="fr-FR" sz="800" noProof="1"/>
+              <a:t>    Stack.bind(this,</a:t>
+            </a:r>
+          </a:p>
+          <a:p>
+            <a:r>
+              <a:rPr lang="fr-FR" sz="800" noProof="1"/>
+              <a:t>        Title.bind(this, "factor"),</a:t>
+            </a:r>
+          </a:p>
+          <a:p>
+            <a:r>
+              <a:rPr lang="fr-FR" sz="800" noProof="1"/>
+              <a:t>        Sequence.bind(this,</a:t>
+            </a:r>
+          </a:p>
+          <a:p>
+            <a:r>
+              <a:rPr lang="fr-FR" sz="800" noProof="1"/>
+              <a:t>            Choice.bind(this, 0,</a:t>
+            </a:r>
+          </a:p>
+          <a:p>
+            <a:r>
+              <a:rPr lang="fr-FR" sz="800" noProof="1"/>
+              <a:t>                NonTerminal.bind(this, "constant"),</a:t>
+            </a:r>
+          </a:p>
+          <a:p>
+            <a:r>
+              <a:rPr lang="fr-FR" sz="800" noProof="1"/>
+              <a:t>                NonTerminal.bind(this, "variable"),</a:t>
+            </a:r>
+          </a:p>
+          <a:p>
+            <a:r>
+              <a:rPr lang="fr-FR" sz="800" noProof="1"/>
+              <a:t>                Sequence.bind(this,</a:t>
+            </a:r>
+          </a:p>
+          <a:p>
+            <a:r>
+              <a:rPr lang="fr-FR" sz="800" noProof="1"/>
+              <a:t>                    Terminal.bind(this, "("),</a:t>
+            </a:r>
+          </a:p>
+          <a:p>
+            <a:r>
+              <a:rPr lang="fr-FR" sz="800" noProof="1"/>
+              <a:t>                    NonTerminal.bind(this, "expression"),</a:t>
+            </a:r>
+          </a:p>
+          <a:p>
+            <a:r>
+              <a:rPr lang="fr-FR" sz="800" noProof="1"/>
+              <a:t>                    Terminal.bind(this, ")")</a:t>
+            </a:r>
+          </a:p>
+          <a:p>
+            <a:r>
+              <a:rPr lang="fr-FR" sz="800" noProof="1"/>
+              <a:t>                )</a:t>
+            </a:r>
+          </a:p>
+          <a:p>
+            <a:r>
+              <a:rPr lang="fr-FR" sz="800" noProof="1"/>
+              <a:t>            )</a:t>
+            </a:r>
+          </a:p>
+          <a:p>
+            <a:r>
+              <a:rPr lang="fr-FR" sz="800" noProof="1"/>
+              <a:t>        ),</a:t>
+            </a:r>
+          </a:p>
+          <a:p>
+            <a:r>
+              <a:rPr lang="fr-FR" sz="800" noProof="1"/>
+              <a:t>        Comment.bind(this, "END factor")</a:t>
+            </a:r>
+          </a:p>
+          <a:p>
+            <a:r>
+              <a:rPr lang="fr-FR" sz="800" noProof="1"/>
+              <a:t>    )</a:t>
+            </a:r>
+          </a:p>
+          <a:p>
+            <a:r>
+              <a:rPr lang="fr-FR" sz="800" noProof="1"/>
+              <a:t>);</a:t>
+            </a:r>
+          </a:p>
+          <a:p>
+            <a:endParaRPr lang="fr-FR" sz="800" noProof="1"/>
+          </a:p>
+          <a:p>
+            <a:r>
+              <a:rPr lang="fr-FR" sz="800" noProof="1"/>
+              <a:t>function RR_term = Diagram.bind(this,</a:t>
+            </a:r>
+          </a:p>
+          <a:p>
+            <a:r>
+              <a:rPr lang="fr-FR" sz="800" noProof="1"/>
+              <a:t>    Sequence.bind(this,</a:t>
+            </a:r>
+          </a:p>
+          <a:p>
+            <a:r>
+              <a:rPr lang="fr-FR" sz="800" noProof="1"/>
+              <a:t>        Title.bind(this, "term"),</a:t>
+            </a:r>
+          </a:p>
+          <a:p>
+            <a:r>
+              <a:rPr lang="fr-FR" sz="800" noProof="1"/>
+              <a:t>        OneOrMore.bind(this,</a:t>
+            </a:r>
+          </a:p>
+          <a:p>
+            <a:r>
+              <a:rPr lang="fr-FR" sz="800" noProof="1"/>
+              <a:t>            NonTerminal.bind(this, "factor"),</a:t>
+            </a:r>
+          </a:p>
+          <a:p>
+            <a:r>
+              <a:rPr lang="fr-FR" sz="800" noProof="1"/>
+              <a:t>            Terminal.bind(this, "*")</a:t>
+            </a:r>
+          </a:p>
+          <a:p>
+            <a:r>
+              <a:rPr lang="fr-FR" sz="800" noProof="1"/>
+              <a:t>        ),</a:t>
+            </a:r>
+          </a:p>
+          <a:p>
+            <a:r>
+              <a:rPr lang="fr-FR" sz="800" noProof="1"/>
+              <a:t>        Comment.bind(this, "END term")</a:t>
+            </a:r>
+          </a:p>
+          <a:p>
+            <a:r>
+              <a:rPr lang="fr-FR" sz="800" noProof="1"/>
+              <a:t>    )</a:t>
+            </a:r>
+          </a:p>
+          <a:p>
+            <a:r>
+              <a:rPr lang="fr-FR" sz="800" noProof="1"/>
+              <a:t>);</a:t>
+            </a:r>
+          </a:p>
+          <a:p>
+            <a:endParaRPr lang="fr-FR" sz="800" noProof="1"/>
+          </a:p>
+          <a:p>
+            <a:r>
+              <a:rPr lang="fr-FR" sz="800" noProof="1"/>
+              <a:t>function RR_variable = Diagram.bind(this,</a:t>
+            </a:r>
+          </a:p>
+          <a:p>
+            <a:r>
+              <a:rPr lang="fr-FR" sz="800" noProof="1"/>
+              <a:t>    Sequence.bind(this,</a:t>
+            </a:r>
+          </a:p>
+          <a:p>
+            <a:r>
+              <a:rPr lang="fr-FR" sz="800" noProof="1"/>
+              <a:t>        Title.bind(this, "variable"),</a:t>
+            </a:r>
+          </a:p>
+          <a:p>
+            <a:r>
+              <a:rPr lang="fr-FR" sz="800" noProof="1"/>
+              <a:t>        Terminal.bind(this, "/[A-Z][A-Za-z0-9_]*/"),</a:t>
+            </a:r>
+          </a:p>
+          <a:p>
+            <a:r>
+              <a:rPr lang="fr-FR" sz="800" noProof="1"/>
+              <a:t>        Comment.bind(this, "END variable")</a:t>
+            </a:r>
+          </a:p>
+          <a:p>
+            <a:r>
+              <a:rPr lang="fr-FR" sz="800" noProof="1"/>
+              <a:t>    )</a:t>
+            </a:r>
+          </a:p>
+          <a:p>
+            <a:r>
+              <a:rPr lang="fr-FR" sz="800" noProof="1"/>
+              <a:t>);</a:t>
+            </a:r>
+          </a:p>
+        </p:txBody>
+      </p:sp>
+    </p:spTree>
+    <p:extLst>
+      <p:ext uri="{BB962C8B-B14F-4D97-AF65-F5344CB8AC3E}">
+        <p14:creationId xmlns:p14="http://schemas.microsoft.com/office/powerpoint/2010/main" val="1799188251"/>
+      </p:ext>
+    </p:extLst>
+  </p:cSld>
+  <p:clrMapOvr>
+    <a:masterClrMapping/>
+  </p:clrMapOvr>
+</p:sld>
+</file>
+
 <file path=ppt/theme/theme1.xml><?xml version="1.0" encoding="utf-8"?>
 <a:theme xmlns:a="http://schemas.openxmlformats.org/drawingml/2006/main" name="Office Theme">
   <a:themeElements>

</xml_diff>